<commit_message>
Updated Presentation and Added img Folder
</commit_message>
<xml_diff>
--- a/Presentation.pptx
+++ b/Presentation.pptx
@@ -6,6 +6,12 @@
   </p:sldMasterIdLst>
   <p:sldIdLst>
     <p:sldId id="256" r:id="rId2"/>
+    <p:sldId id="257" r:id="rId3"/>
+    <p:sldId id="258" r:id="rId4"/>
+    <p:sldId id="259" r:id="rId5"/>
+    <p:sldId id="260" r:id="rId6"/>
+    <p:sldId id="261" r:id="rId7"/>
+    <p:sldId id="262" r:id="rId8"/>
   </p:sldIdLst>
   <p:sldSz cx="12192000" cy="6858000"/>
   <p:notesSz cx="6858000" cy="9144000"/>
@@ -104,6 +110,11 @@
       </a:defRPr>
     </a:lvl9pPr>
   </p:defaultTextStyle>
+  <p:extLst>
+    <p:ext uri="{EFAFB233-063F-42B5-8137-9DF3F51BA10A}">
+      <p15:sldGuideLst xmlns:p15="http://schemas.microsoft.com/office/powerpoint/2012/main"/>
+    </p:ext>
+  </p:extLst>
 </p:presentation>
 </file>
 
@@ -3343,10 +3354,29 @@
         </p:nvSpPr>
         <p:spPr/>
         <p:txBody>
-          <a:bodyPr/>
-          <a:lstStyle/>
-          <a:p>
-            <a:endParaRPr lang="en-US"/>
+          <a:bodyPr>
+            <a:normAutofit fontScale="90000"/>
+          </a:bodyPr>
+          <a:lstStyle/>
+          <a:p>
+            <a:r>
+              <a:rPr lang="en-US" dirty="0"/>
+              <a:t>HEX &amp; BINARY</a:t>
+            </a:r>
+            <a:br>
+              <a:rPr lang="en-US" dirty="0"/>
+            </a:br>
+            <a:r>
+              <a:rPr lang="en-US" dirty="0"/>
+              <a:t>XOR, AND, OR</a:t>
+            </a:r>
+            <a:br>
+              <a:rPr lang="en-US" dirty="0"/>
+            </a:br>
+            <a:r>
+              <a:rPr lang="en-US" dirty="0"/>
+              <a:t>Calculator</a:t>
+            </a:r>
           </a:p>
         </p:txBody>
       </p:sp>
@@ -3371,7 +3401,10 @@
           <a:bodyPr/>
           <a:lstStyle/>
           <a:p>
-            <a:endParaRPr lang="en-US"/>
+            <a:r>
+              <a:rPr lang="en-US" dirty="0"/>
+              <a:t>Dalton Neely</a:t>
+            </a:r>
           </a:p>
         </p:txBody>
       </p:sp>
@@ -3379,6 +3412,1271 @@
     <p:extLst>
       <p:ext uri="{BB962C8B-B14F-4D97-AF65-F5344CB8AC3E}">
         <p14:creationId xmlns:p14="http://schemas.microsoft.com/office/powerpoint/2010/main" val="1693465048"/>
+      </p:ext>
+    </p:extLst>
+  </p:cSld>
+  <p:clrMapOvr>
+    <a:masterClrMapping/>
+  </p:clrMapOvr>
+</p:sld>
+</file>
+
+<file path=ppt/slides/slide2.xml><?xml version="1.0" encoding="utf-8"?>
+<p:sld xmlns:a="http://schemas.openxmlformats.org/drawingml/2006/main" xmlns:r="http://schemas.openxmlformats.org/officeDocument/2006/relationships" xmlns:p="http://schemas.openxmlformats.org/presentationml/2006/main">
+  <p:cSld>
+    <p:spTree>
+      <p:nvGrpSpPr>
+        <p:cNvPr id="1" name=""/>
+        <p:cNvGrpSpPr/>
+        <p:nvPr/>
+      </p:nvGrpSpPr>
+      <p:grpSpPr>
+        <a:xfrm>
+          <a:off x="0" y="0"/>
+          <a:ext cx="0" cy="0"/>
+          <a:chOff x="0" y="0"/>
+          <a:chExt cx="0" cy="0"/>
+        </a:xfrm>
+      </p:grpSpPr>
+      <p:sp>
+        <p:nvSpPr>
+          <p:cNvPr id="2" name="Title 1">
+            <a:extLst>
+              <a:ext uri="{FF2B5EF4-FFF2-40B4-BE49-F238E27FC236}">
+                <a16:creationId xmlns:a16="http://schemas.microsoft.com/office/drawing/2014/main" id="{EEFBD210-A806-472C-99C0-F52CDD8F7ABF}"/>
+              </a:ext>
+            </a:extLst>
+          </p:cNvPr>
+          <p:cNvSpPr>
+            <a:spLocks noGrp="1"/>
+          </p:cNvSpPr>
+          <p:nvPr>
+            <p:ph type="title"/>
+          </p:nvPr>
+        </p:nvSpPr>
+        <p:spPr/>
+        <p:txBody>
+          <a:bodyPr/>
+          <a:lstStyle/>
+          <a:p>
+            <a:r>
+              <a:rPr lang="en-US" dirty="0"/>
+              <a:t>Description</a:t>
+            </a:r>
+          </a:p>
+        </p:txBody>
+      </p:sp>
+      <p:sp>
+        <p:nvSpPr>
+          <p:cNvPr id="3" name="Content Placeholder 2">
+            <a:extLst>
+              <a:ext uri="{FF2B5EF4-FFF2-40B4-BE49-F238E27FC236}">
+                <a16:creationId xmlns:a16="http://schemas.microsoft.com/office/drawing/2014/main" id="{183854DD-B20E-41FD-8800-84F91EE8B55C}"/>
+              </a:ext>
+            </a:extLst>
+          </p:cNvPr>
+          <p:cNvSpPr>
+            <a:spLocks noGrp="1"/>
+          </p:cNvSpPr>
+          <p:nvPr>
+            <p:ph idx="1"/>
+          </p:nvPr>
+        </p:nvSpPr>
+        <p:spPr/>
+        <p:txBody>
+          <a:bodyPr/>
+          <a:lstStyle/>
+          <a:p>
+            <a:r>
+              <a:rPr lang="en-US" dirty="0"/>
+              <a:t>My final project is an app that does XOR, AND, and OR operations on HEX and BINARY input</a:t>
+            </a:r>
+          </a:p>
+          <a:p>
+            <a:r>
+              <a:rPr lang="en-US" dirty="0"/>
+              <a:t>API USED: 27 (Oreo)</a:t>
+            </a:r>
+          </a:p>
+          <a:p>
+            <a:r>
+              <a:rPr lang="en-US" dirty="0"/>
+              <a:t>Testing Framework: Junit 4</a:t>
+            </a:r>
+          </a:p>
+        </p:txBody>
+      </p:sp>
+    </p:spTree>
+    <p:extLst>
+      <p:ext uri="{BB962C8B-B14F-4D97-AF65-F5344CB8AC3E}">
+        <p14:creationId xmlns:p14="http://schemas.microsoft.com/office/powerpoint/2010/main" val="3459222799"/>
+      </p:ext>
+    </p:extLst>
+  </p:cSld>
+  <p:clrMapOvr>
+    <a:masterClrMapping/>
+  </p:clrMapOvr>
+</p:sld>
+</file>
+
+<file path=ppt/slides/slide3.xml><?xml version="1.0" encoding="utf-8"?>
+<p:sld xmlns:a="http://schemas.openxmlformats.org/drawingml/2006/main" xmlns:r="http://schemas.openxmlformats.org/officeDocument/2006/relationships" xmlns:p="http://schemas.openxmlformats.org/presentationml/2006/main">
+  <p:cSld>
+    <p:spTree>
+      <p:nvGrpSpPr>
+        <p:cNvPr id="1" name=""/>
+        <p:cNvGrpSpPr/>
+        <p:nvPr/>
+      </p:nvGrpSpPr>
+      <p:grpSpPr>
+        <a:xfrm>
+          <a:off x="0" y="0"/>
+          <a:ext cx="0" cy="0"/>
+          <a:chOff x="0" y="0"/>
+          <a:chExt cx="0" cy="0"/>
+        </a:xfrm>
+      </p:grpSpPr>
+      <p:sp>
+        <p:nvSpPr>
+          <p:cNvPr id="2" name="Title 1">
+            <a:extLst>
+              <a:ext uri="{FF2B5EF4-FFF2-40B4-BE49-F238E27FC236}">
+                <a16:creationId xmlns:a16="http://schemas.microsoft.com/office/drawing/2014/main" id="{5CA7C48A-1E6B-425E-9EBE-E7813699F1BB}"/>
+              </a:ext>
+            </a:extLst>
+          </p:cNvPr>
+          <p:cNvSpPr>
+            <a:spLocks noGrp="1"/>
+          </p:cNvSpPr>
+          <p:nvPr>
+            <p:ph type="title"/>
+          </p:nvPr>
+        </p:nvSpPr>
+        <p:spPr/>
+        <p:txBody>
+          <a:bodyPr/>
+          <a:lstStyle/>
+          <a:p>
+            <a:r>
+              <a:rPr lang="en-US" dirty="0"/>
+              <a:t>App Running on Emulator</a:t>
+            </a:r>
+          </a:p>
+        </p:txBody>
+      </p:sp>
+      <p:pic>
+        <p:nvPicPr>
+          <p:cNvPr id="5" name="Content Placeholder 4">
+            <a:extLst>
+              <a:ext uri="{FF2B5EF4-FFF2-40B4-BE49-F238E27FC236}">
+                <a16:creationId xmlns:a16="http://schemas.microsoft.com/office/drawing/2014/main" id="{D49307C1-E7E0-4B84-A93A-53EE8FB0F22D}"/>
+              </a:ext>
+            </a:extLst>
+          </p:cNvPr>
+          <p:cNvPicPr>
+            <a:picLocks noGrp="1" noChangeAspect="1"/>
+          </p:cNvPicPr>
+          <p:nvPr>
+            <p:ph idx="1"/>
+          </p:nvPr>
+        </p:nvPicPr>
+        <p:blipFill>
+          <a:blip r:embed="rId2">
+            <a:extLst>
+              <a:ext uri="{28A0092B-C50C-407E-A947-70E740481C1C}">
+                <a14:useLocalDpi xmlns:a14="http://schemas.microsoft.com/office/drawing/2010/main" val="0"/>
+              </a:ext>
+            </a:extLst>
+          </a:blip>
+          <a:stretch>
+            <a:fillRect/>
+          </a:stretch>
+        </p:blipFill>
+        <p:spPr>
+          <a:xfrm>
+            <a:off x="8280443" y="30110"/>
+            <a:ext cx="3816481" cy="6797780"/>
+          </a:xfrm>
+        </p:spPr>
+      </p:pic>
+      <p:sp>
+        <p:nvSpPr>
+          <p:cNvPr id="6" name="TextBox 5">
+            <a:extLst>
+              <a:ext uri="{FF2B5EF4-FFF2-40B4-BE49-F238E27FC236}">
+                <a16:creationId xmlns:a16="http://schemas.microsoft.com/office/drawing/2014/main" id="{1E6A2042-B93E-4013-9528-2C8239B3B550}"/>
+              </a:ext>
+            </a:extLst>
+          </p:cNvPr>
+          <p:cNvSpPr txBox="1"/>
+          <p:nvPr/>
+        </p:nvSpPr>
+        <p:spPr>
+          <a:xfrm>
+            <a:off x="838200" y="1778466"/>
+            <a:ext cx="5705213" cy="5000728"/>
+          </a:xfrm>
+          <a:prstGeom prst="rect">
+            <a:avLst/>
+          </a:prstGeom>
+          <a:noFill/>
+        </p:spPr>
+        <p:txBody>
+          <a:bodyPr wrap="square" rtlCol="0">
+            <a:spAutoFit/>
+          </a:bodyPr>
+          <a:lstStyle/>
+          <a:p>
+            <a:pPr marL="285750" indent="-285750">
+              <a:lnSpc>
+                <a:spcPct val="200000"/>
+              </a:lnSpc>
+              <a:buFont typeface="Arial" panose="020B0604020202020204" pitchFamily="34" charset="0"/>
+              <a:buChar char="•"/>
+            </a:pPr>
+            <a:r>
+              <a:rPr lang="en-US" dirty="0"/>
+              <a:t>Input Box 1</a:t>
+            </a:r>
+          </a:p>
+          <a:p>
+            <a:pPr marL="285750" indent="-285750">
+              <a:lnSpc>
+                <a:spcPct val="200000"/>
+              </a:lnSpc>
+              <a:buFont typeface="Arial" panose="020B0604020202020204" pitchFamily="34" charset="0"/>
+              <a:buChar char="•"/>
+            </a:pPr>
+            <a:r>
+              <a:rPr lang="en-US" dirty="0"/>
+              <a:t>Input Box 2</a:t>
+            </a:r>
+          </a:p>
+          <a:p>
+            <a:pPr marL="285750" indent="-285750">
+              <a:lnSpc>
+                <a:spcPct val="200000"/>
+              </a:lnSpc>
+              <a:buFont typeface="Arial" panose="020B0604020202020204" pitchFamily="34" charset="0"/>
+              <a:buChar char="•"/>
+            </a:pPr>
+            <a:r>
+              <a:rPr lang="en-US" dirty="0"/>
+              <a:t>Operation Box</a:t>
+            </a:r>
+          </a:p>
+          <a:p>
+            <a:pPr marL="285750" indent="-285750">
+              <a:lnSpc>
+                <a:spcPct val="200000"/>
+              </a:lnSpc>
+              <a:buFont typeface="Arial" panose="020B0604020202020204" pitchFamily="34" charset="0"/>
+              <a:buChar char="•"/>
+            </a:pPr>
+            <a:r>
+              <a:rPr lang="en-US" dirty="0"/>
+              <a:t>Input Numbers</a:t>
+            </a:r>
+          </a:p>
+          <a:p>
+            <a:pPr marL="285750" indent="-285750">
+              <a:lnSpc>
+                <a:spcPct val="200000"/>
+              </a:lnSpc>
+              <a:buFont typeface="Arial" panose="020B0604020202020204" pitchFamily="34" charset="0"/>
+              <a:buChar char="•"/>
+            </a:pPr>
+            <a:r>
+              <a:rPr lang="en-US" dirty="0"/>
+              <a:t>Back Button</a:t>
+            </a:r>
+          </a:p>
+          <a:p>
+            <a:pPr marL="285750" indent="-285750">
+              <a:lnSpc>
+                <a:spcPct val="200000"/>
+              </a:lnSpc>
+              <a:buFont typeface="Arial" panose="020B0604020202020204" pitchFamily="34" charset="0"/>
+              <a:buChar char="•"/>
+            </a:pPr>
+            <a:r>
+              <a:rPr lang="en-US" dirty="0"/>
+              <a:t>Clear Button</a:t>
+            </a:r>
+          </a:p>
+          <a:p>
+            <a:pPr marL="285750" indent="-285750">
+              <a:lnSpc>
+                <a:spcPct val="200000"/>
+              </a:lnSpc>
+              <a:buFont typeface="Arial" panose="020B0604020202020204" pitchFamily="34" charset="0"/>
+              <a:buChar char="•"/>
+            </a:pPr>
+            <a:r>
+              <a:rPr lang="en-US" dirty="0"/>
+              <a:t>Enter Button</a:t>
+            </a:r>
+          </a:p>
+          <a:p>
+            <a:pPr marL="285750" indent="-285750">
+              <a:lnSpc>
+                <a:spcPct val="200000"/>
+              </a:lnSpc>
+              <a:buFont typeface="Arial" panose="020B0604020202020204" pitchFamily="34" charset="0"/>
+              <a:buChar char="•"/>
+            </a:pPr>
+            <a:r>
+              <a:rPr lang="en-US" dirty="0"/>
+              <a:t>HEX/BINARY buttons</a:t>
+            </a:r>
+          </a:p>
+          <a:p>
+            <a:pPr marL="285750" indent="-285750">
+              <a:lnSpc>
+                <a:spcPct val="200000"/>
+              </a:lnSpc>
+              <a:buFont typeface="Arial" panose="020B0604020202020204" pitchFamily="34" charset="0"/>
+              <a:buChar char="•"/>
+            </a:pPr>
+            <a:r>
+              <a:rPr lang="en-US" dirty="0"/>
+              <a:t>AND/XOR/OR buttons</a:t>
+            </a:r>
+          </a:p>
+        </p:txBody>
+      </p:sp>
+      <p:cxnSp>
+        <p:nvCxnSpPr>
+          <p:cNvPr id="8" name="Straight Arrow Connector 7">
+            <a:extLst>
+              <a:ext uri="{FF2B5EF4-FFF2-40B4-BE49-F238E27FC236}">
+                <a16:creationId xmlns:a16="http://schemas.microsoft.com/office/drawing/2014/main" id="{E2779F72-5205-4BD3-8990-A4A93A7A48C9}"/>
+              </a:ext>
+            </a:extLst>
+          </p:cNvPr>
+          <p:cNvCxnSpPr/>
+          <p:nvPr/>
+        </p:nvCxnSpPr>
+        <p:spPr>
+          <a:xfrm flipV="1">
+            <a:off x="2315361" y="1031846"/>
+            <a:ext cx="6887362" cy="1132514"/>
+          </a:xfrm>
+          <a:prstGeom prst="straightConnector1">
+            <a:avLst/>
+          </a:prstGeom>
+          <a:ln>
+            <a:tailEnd type="triangle"/>
+          </a:ln>
+        </p:spPr>
+        <p:style>
+          <a:lnRef idx="1">
+            <a:schemeClr val="dk1"/>
+          </a:lnRef>
+          <a:fillRef idx="0">
+            <a:schemeClr val="dk1"/>
+          </a:fillRef>
+          <a:effectRef idx="0">
+            <a:schemeClr val="dk1"/>
+          </a:effectRef>
+          <a:fontRef idx="minor">
+            <a:schemeClr val="tx1"/>
+          </a:fontRef>
+        </p:style>
+      </p:cxnSp>
+      <p:cxnSp>
+        <p:nvCxnSpPr>
+          <p:cNvPr id="10" name="Straight Arrow Connector 9">
+            <a:extLst>
+              <a:ext uri="{FF2B5EF4-FFF2-40B4-BE49-F238E27FC236}">
+                <a16:creationId xmlns:a16="http://schemas.microsoft.com/office/drawing/2014/main" id="{0FDC13FC-1942-4AFA-9CD0-99C2BF5CEAD8}"/>
+              </a:ext>
+            </a:extLst>
+          </p:cNvPr>
+          <p:cNvCxnSpPr/>
+          <p:nvPr/>
+        </p:nvCxnSpPr>
+        <p:spPr>
+          <a:xfrm flipV="1">
+            <a:off x="2306972" y="1325461"/>
+            <a:ext cx="8321879" cy="1400961"/>
+          </a:xfrm>
+          <a:prstGeom prst="straightConnector1">
+            <a:avLst/>
+          </a:prstGeom>
+          <a:ln>
+            <a:tailEnd type="triangle"/>
+          </a:ln>
+        </p:spPr>
+        <p:style>
+          <a:lnRef idx="1">
+            <a:schemeClr val="dk1"/>
+          </a:lnRef>
+          <a:fillRef idx="0">
+            <a:schemeClr val="dk1"/>
+          </a:fillRef>
+          <a:effectRef idx="0">
+            <a:schemeClr val="dk1"/>
+          </a:effectRef>
+          <a:fontRef idx="minor">
+            <a:schemeClr val="tx1"/>
+          </a:fontRef>
+        </p:style>
+      </p:cxnSp>
+      <p:cxnSp>
+        <p:nvCxnSpPr>
+          <p:cNvPr id="12" name="Straight Arrow Connector 11">
+            <a:extLst>
+              <a:ext uri="{FF2B5EF4-FFF2-40B4-BE49-F238E27FC236}">
+                <a16:creationId xmlns:a16="http://schemas.microsoft.com/office/drawing/2014/main" id="{A90A6B09-C8A9-443F-8DB3-CB69D21E51F9}"/>
+              </a:ext>
+            </a:extLst>
+          </p:cNvPr>
+          <p:cNvCxnSpPr/>
+          <p:nvPr/>
+        </p:nvCxnSpPr>
+        <p:spPr>
+          <a:xfrm flipV="1">
+            <a:off x="2533475" y="964734"/>
+            <a:ext cx="7508147" cy="2290194"/>
+          </a:xfrm>
+          <a:prstGeom prst="straightConnector1">
+            <a:avLst/>
+          </a:prstGeom>
+          <a:ln>
+            <a:tailEnd type="triangle"/>
+          </a:ln>
+        </p:spPr>
+        <p:style>
+          <a:lnRef idx="1">
+            <a:schemeClr val="accent2"/>
+          </a:lnRef>
+          <a:fillRef idx="0">
+            <a:schemeClr val="accent2"/>
+          </a:fillRef>
+          <a:effectRef idx="0">
+            <a:schemeClr val="accent2"/>
+          </a:effectRef>
+          <a:fontRef idx="minor">
+            <a:schemeClr val="tx1"/>
+          </a:fontRef>
+        </p:style>
+      </p:cxnSp>
+      <p:cxnSp>
+        <p:nvCxnSpPr>
+          <p:cNvPr id="14" name="Straight Arrow Connector 13">
+            <a:extLst>
+              <a:ext uri="{FF2B5EF4-FFF2-40B4-BE49-F238E27FC236}">
+                <a16:creationId xmlns:a16="http://schemas.microsoft.com/office/drawing/2014/main" id="{5B9945D0-604F-4B8F-BFCE-2C5F288A8AEB}"/>
+              </a:ext>
+            </a:extLst>
+          </p:cNvPr>
+          <p:cNvCxnSpPr/>
+          <p:nvPr/>
+        </p:nvCxnSpPr>
+        <p:spPr>
+          <a:xfrm flipV="1">
+            <a:off x="2726932" y="3104029"/>
+            <a:ext cx="6047952" cy="750508"/>
+          </a:xfrm>
+          <a:prstGeom prst="straightConnector1">
+            <a:avLst/>
+          </a:prstGeom>
+          <a:ln>
+            <a:tailEnd type="triangle"/>
+          </a:ln>
+        </p:spPr>
+        <p:style>
+          <a:lnRef idx="1">
+            <a:schemeClr val="dk1"/>
+          </a:lnRef>
+          <a:fillRef idx="0">
+            <a:schemeClr val="dk1"/>
+          </a:fillRef>
+          <a:effectRef idx="0">
+            <a:schemeClr val="dk1"/>
+          </a:effectRef>
+          <a:fontRef idx="minor">
+            <a:schemeClr val="tx1"/>
+          </a:fontRef>
+        </p:style>
+      </p:cxnSp>
+      <p:cxnSp>
+        <p:nvCxnSpPr>
+          <p:cNvPr id="16" name="Straight Arrow Connector 15">
+            <a:extLst>
+              <a:ext uri="{FF2B5EF4-FFF2-40B4-BE49-F238E27FC236}">
+                <a16:creationId xmlns:a16="http://schemas.microsoft.com/office/drawing/2014/main" id="{64F84E4B-FFDB-4D26-A549-162326F1487C}"/>
+              </a:ext>
+            </a:extLst>
+          </p:cNvPr>
+          <p:cNvCxnSpPr>
+            <a:cxnSpLocks/>
+          </p:cNvCxnSpPr>
+          <p:nvPr/>
+        </p:nvCxnSpPr>
+        <p:spPr>
+          <a:xfrm>
+            <a:off x="2407640" y="4353886"/>
+            <a:ext cx="6543413" cy="151002"/>
+          </a:xfrm>
+          <a:prstGeom prst="straightConnector1">
+            <a:avLst/>
+          </a:prstGeom>
+          <a:ln>
+            <a:tailEnd type="triangle"/>
+          </a:ln>
+        </p:spPr>
+        <p:style>
+          <a:lnRef idx="1">
+            <a:schemeClr val="dk1"/>
+          </a:lnRef>
+          <a:fillRef idx="0">
+            <a:schemeClr val="dk1"/>
+          </a:fillRef>
+          <a:effectRef idx="0">
+            <a:schemeClr val="dk1"/>
+          </a:effectRef>
+          <a:fontRef idx="minor">
+            <a:schemeClr val="tx1"/>
+          </a:fontRef>
+        </p:style>
+      </p:cxnSp>
+      <p:cxnSp>
+        <p:nvCxnSpPr>
+          <p:cNvPr id="19" name="Straight Arrow Connector 18">
+            <a:extLst>
+              <a:ext uri="{FF2B5EF4-FFF2-40B4-BE49-F238E27FC236}">
+                <a16:creationId xmlns:a16="http://schemas.microsoft.com/office/drawing/2014/main" id="{C88AFEC4-3B6C-4F32-B48B-8105F1CCE661}"/>
+              </a:ext>
+            </a:extLst>
+          </p:cNvPr>
+          <p:cNvCxnSpPr/>
+          <p:nvPr/>
+        </p:nvCxnSpPr>
+        <p:spPr>
+          <a:xfrm flipV="1">
+            <a:off x="2457974" y="4538444"/>
+            <a:ext cx="8170877" cy="419450"/>
+          </a:xfrm>
+          <a:prstGeom prst="straightConnector1">
+            <a:avLst/>
+          </a:prstGeom>
+          <a:ln>
+            <a:tailEnd type="triangle"/>
+          </a:ln>
+        </p:spPr>
+        <p:style>
+          <a:lnRef idx="1">
+            <a:schemeClr val="accent2"/>
+          </a:lnRef>
+          <a:fillRef idx="0">
+            <a:schemeClr val="accent2"/>
+          </a:fillRef>
+          <a:effectRef idx="0">
+            <a:schemeClr val="accent2"/>
+          </a:effectRef>
+          <a:fontRef idx="minor">
+            <a:schemeClr val="tx1"/>
+          </a:fontRef>
+        </p:style>
+      </p:cxnSp>
+      <p:cxnSp>
+        <p:nvCxnSpPr>
+          <p:cNvPr id="21" name="Straight Arrow Connector 20">
+            <a:extLst>
+              <a:ext uri="{FF2B5EF4-FFF2-40B4-BE49-F238E27FC236}">
+                <a16:creationId xmlns:a16="http://schemas.microsoft.com/office/drawing/2014/main" id="{53FA9CD6-6531-43A3-AFB8-97E7570E66A1}"/>
+              </a:ext>
+            </a:extLst>
+          </p:cNvPr>
+          <p:cNvCxnSpPr/>
+          <p:nvPr/>
+        </p:nvCxnSpPr>
+        <p:spPr>
+          <a:xfrm>
+            <a:off x="2407640" y="5482001"/>
+            <a:ext cx="7558481" cy="121845"/>
+          </a:xfrm>
+          <a:prstGeom prst="straightConnector1">
+            <a:avLst/>
+          </a:prstGeom>
+          <a:ln>
+            <a:tailEnd type="triangle"/>
+          </a:ln>
+        </p:spPr>
+        <p:style>
+          <a:lnRef idx="1">
+            <a:schemeClr val="dk1"/>
+          </a:lnRef>
+          <a:fillRef idx="0">
+            <a:schemeClr val="dk1"/>
+          </a:fillRef>
+          <a:effectRef idx="0">
+            <a:schemeClr val="dk1"/>
+          </a:effectRef>
+          <a:fontRef idx="minor">
+            <a:schemeClr val="tx1"/>
+          </a:fontRef>
+        </p:style>
+      </p:cxnSp>
+      <p:cxnSp>
+        <p:nvCxnSpPr>
+          <p:cNvPr id="23" name="Straight Arrow Connector 22">
+            <a:extLst>
+              <a:ext uri="{FF2B5EF4-FFF2-40B4-BE49-F238E27FC236}">
+                <a16:creationId xmlns:a16="http://schemas.microsoft.com/office/drawing/2014/main" id="{95E78A74-5FC2-41F2-8DB1-1F2921FB4524}"/>
+              </a:ext>
+            </a:extLst>
+          </p:cNvPr>
+          <p:cNvCxnSpPr/>
+          <p:nvPr/>
+        </p:nvCxnSpPr>
+        <p:spPr>
+          <a:xfrm flipV="1">
+            <a:off x="3103927" y="5666559"/>
+            <a:ext cx="6098796" cy="390292"/>
+          </a:xfrm>
+          <a:prstGeom prst="straightConnector1">
+            <a:avLst/>
+          </a:prstGeom>
+          <a:ln>
+            <a:tailEnd type="triangle"/>
+          </a:ln>
+        </p:spPr>
+        <p:style>
+          <a:lnRef idx="1">
+            <a:schemeClr val="accent1"/>
+          </a:lnRef>
+          <a:fillRef idx="0">
+            <a:schemeClr val="accent1"/>
+          </a:fillRef>
+          <a:effectRef idx="0">
+            <a:schemeClr val="accent1"/>
+          </a:effectRef>
+          <a:fontRef idx="minor">
+            <a:schemeClr val="tx1"/>
+          </a:fontRef>
+        </p:style>
+      </p:cxnSp>
+      <p:cxnSp>
+        <p:nvCxnSpPr>
+          <p:cNvPr id="25" name="Straight Arrow Connector 24">
+            <a:extLst>
+              <a:ext uri="{FF2B5EF4-FFF2-40B4-BE49-F238E27FC236}">
+                <a16:creationId xmlns:a16="http://schemas.microsoft.com/office/drawing/2014/main" id="{3F11839B-2E1E-4526-9F50-1D9D9F458AA8}"/>
+              </a:ext>
+            </a:extLst>
+          </p:cNvPr>
+          <p:cNvCxnSpPr/>
+          <p:nvPr/>
+        </p:nvCxnSpPr>
+        <p:spPr>
+          <a:xfrm flipV="1">
+            <a:off x="3095538" y="5788404"/>
+            <a:ext cx="7776594" cy="339549"/>
+          </a:xfrm>
+          <a:prstGeom prst="straightConnector1">
+            <a:avLst/>
+          </a:prstGeom>
+          <a:ln>
+            <a:tailEnd type="triangle"/>
+          </a:ln>
+        </p:spPr>
+        <p:style>
+          <a:lnRef idx="1">
+            <a:schemeClr val="accent1"/>
+          </a:lnRef>
+          <a:fillRef idx="0">
+            <a:schemeClr val="accent1"/>
+          </a:fillRef>
+          <a:effectRef idx="0">
+            <a:schemeClr val="accent1"/>
+          </a:effectRef>
+          <a:fontRef idx="minor">
+            <a:schemeClr val="tx1"/>
+          </a:fontRef>
+        </p:style>
+      </p:cxnSp>
+      <p:cxnSp>
+        <p:nvCxnSpPr>
+          <p:cNvPr id="27" name="Straight Arrow Connector 26">
+            <a:extLst>
+              <a:ext uri="{FF2B5EF4-FFF2-40B4-BE49-F238E27FC236}">
+                <a16:creationId xmlns:a16="http://schemas.microsoft.com/office/drawing/2014/main" id="{C43E870B-9951-445A-83F8-2EDC33709814}"/>
+              </a:ext>
+            </a:extLst>
+          </p:cNvPr>
+          <p:cNvCxnSpPr/>
+          <p:nvPr/>
+        </p:nvCxnSpPr>
+        <p:spPr>
+          <a:xfrm flipV="1">
+            <a:off x="3254928" y="6127953"/>
+            <a:ext cx="5746459" cy="423849"/>
+          </a:xfrm>
+          <a:prstGeom prst="straightConnector1">
+            <a:avLst/>
+          </a:prstGeom>
+          <a:ln>
+            <a:tailEnd type="triangle"/>
+          </a:ln>
+        </p:spPr>
+        <p:style>
+          <a:lnRef idx="1">
+            <a:schemeClr val="dk1"/>
+          </a:lnRef>
+          <a:fillRef idx="0">
+            <a:schemeClr val="dk1"/>
+          </a:fillRef>
+          <a:effectRef idx="0">
+            <a:schemeClr val="dk1"/>
+          </a:effectRef>
+          <a:fontRef idx="minor">
+            <a:schemeClr val="tx1"/>
+          </a:fontRef>
+        </p:style>
+      </p:cxnSp>
+    </p:spTree>
+    <p:extLst>
+      <p:ext uri="{BB962C8B-B14F-4D97-AF65-F5344CB8AC3E}">
+        <p14:creationId xmlns:p14="http://schemas.microsoft.com/office/powerpoint/2010/main" val="3528549096"/>
+      </p:ext>
+    </p:extLst>
+  </p:cSld>
+  <p:clrMapOvr>
+    <a:masterClrMapping/>
+  </p:clrMapOvr>
+</p:sld>
+</file>
+
+<file path=ppt/slides/slide4.xml><?xml version="1.0" encoding="utf-8"?>
+<p:sld xmlns:a="http://schemas.openxmlformats.org/drawingml/2006/main" xmlns:r="http://schemas.openxmlformats.org/officeDocument/2006/relationships" xmlns:p="http://schemas.openxmlformats.org/presentationml/2006/main">
+  <p:cSld>
+    <p:spTree>
+      <p:nvGrpSpPr>
+        <p:cNvPr id="1" name=""/>
+        <p:cNvGrpSpPr/>
+        <p:nvPr/>
+      </p:nvGrpSpPr>
+      <p:grpSpPr>
+        <a:xfrm>
+          <a:off x="0" y="0"/>
+          <a:ext cx="0" cy="0"/>
+          <a:chOff x="0" y="0"/>
+          <a:chExt cx="0" cy="0"/>
+        </a:xfrm>
+      </p:grpSpPr>
+      <p:sp>
+        <p:nvSpPr>
+          <p:cNvPr id="2" name="Title 1">
+            <a:extLst>
+              <a:ext uri="{FF2B5EF4-FFF2-40B4-BE49-F238E27FC236}">
+                <a16:creationId xmlns:a16="http://schemas.microsoft.com/office/drawing/2014/main" id="{A48F7E74-3FCA-41B5-9CA7-3199C0245DC8}"/>
+              </a:ext>
+            </a:extLst>
+          </p:cNvPr>
+          <p:cNvSpPr>
+            <a:spLocks noGrp="1"/>
+          </p:cNvSpPr>
+          <p:nvPr>
+            <p:ph type="title"/>
+          </p:nvPr>
+        </p:nvSpPr>
+        <p:spPr/>
+        <p:txBody>
+          <a:bodyPr/>
+          <a:lstStyle/>
+          <a:p>
+            <a:r>
+              <a:rPr lang="en-US" dirty="0"/>
+              <a:t>BINARY Mode</a:t>
+            </a:r>
+          </a:p>
+        </p:txBody>
+      </p:sp>
+      <p:pic>
+        <p:nvPicPr>
+          <p:cNvPr id="5" name="Content Placeholder 4">
+            <a:extLst>
+              <a:ext uri="{FF2B5EF4-FFF2-40B4-BE49-F238E27FC236}">
+                <a16:creationId xmlns:a16="http://schemas.microsoft.com/office/drawing/2014/main" id="{44539C8A-8E4A-40B9-8B10-BB8536A14C48}"/>
+              </a:ext>
+            </a:extLst>
+          </p:cNvPr>
+          <p:cNvPicPr>
+            <a:picLocks noGrp="1" noChangeAspect="1"/>
+          </p:cNvPicPr>
+          <p:nvPr>
+            <p:ph idx="1"/>
+          </p:nvPr>
+        </p:nvPicPr>
+        <p:blipFill>
+          <a:blip r:embed="rId2">
+            <a:extLst>
+              <a:ext uri="{28A0092B-C50C-407E-A947-70E740481C1C}">
+                <a14:useLocalDpi xmlns:a14="http://schemas.microsoft.com/office/drawing/2010/main" val="0"/>
+              </a:ext>
+            </a:extLst>
+          </a:blip>
+          <a:stretch>
+            <a:fillRect/>
+          </a:stretch>
+        </p:blipFill>
+        <p:spPr>
+          <a:xfrm>
+            <a:off x="8316796" y="-22188"/>
+            <a:ext cx="3875204" cy="6902375"/>
+          </a:xfrm>
+        </p:spPr>
+      </p:pic>
+      <p:sp>
+        <p:nvSpPr>
+          <p:cNvPr id="6" name="TextBox 5">
+            <a:extLst>
+              <a:ext uri="{FF2B5EF4-FFF2-40B4-BE49-F238E27FC236}">
+                <a16:creationId xmlns:a16="http://schemas.microsoft.com/office/drawing/2014/main" id="{B5D32202-410D-4006-96E9-F1E23943C818}"/>
+              </a:ext>
+            </a:extLst>
+          </p:cNvPr>
+          <p:cNvSpPr txBox="1"/>
+          <p:nvPr/>
+        </p:nvSpPr>
+        <p:spPr>
+          <a:xfrm>
+            <a:off x="913701" y="1845578"/>
+            <a:ext cx="4530754" cy="2230739"/>
+          </a:xfrm>
+          <a:prstGeom prst="rect">
+            <a:avLst/>
+          </a:prstGeom>
+          <a:noFill/>
+        </p:spPr>
+        <p:txBody>
+          <a:bodyPr wrap="square" rtlCol="0">
+            <a:spAutoFit/>
+          </a:bodyPr>
+          <a:lstStyle/>
+          <a:p>
+            <a:pPr marL="285750" indent="-285750">
+              <a:lnSpc>
+                <a:spcPct val="200000"/>
+              </a:lnSpc>
+              <a:buFont typeface="Arial" panose="020B0604020202020204" pitchFamily="34" charset="0"/>
+              <a:buChar char="•"/>
+            </a:pPr>
+            <a:r>
+              <a:rPr lang="en-US" dirty="0"/>
+              <a:t>Input Box 1: 111110110</a:t>
+            </a:r>
+          </a:p>
+          <a:p>
+            <a:pPr marL="285750" indent="-285750">
+              <a:lnSpc>
+                <a:spcPct val="200000"/>
+              </a:lnSpc>
+              <a:buFont typeface="Arial" panose="020B0604020202020204" pitchFamily="34" charset="0"/>
+              <a:buChar char="•"/>
+            </a:pPr>
+            <a:r>
+              <a:rPr lang="en-US" dirty="0"/>
+              <a:t>Input Box 2: 111100</a:t>
+            </a:r>
+          </a:p>
+          <a:p>
+            <a:pPr marL="285750" indent="-285750">
+              <a:lnSpc>
+                <a:spcPct val="200000"/>
+              </a:lnSpc>
+              <a:buFont typeface="Arial" panose="020B0604020202020204" pitchFamily="34" charset="0"/>
+              <a:buChar char="•"/>
+            </a:pPr>
+            <a:r>
+              <a:rPr lang="en-US" dirty="0"/>
+              <a:t>Operation Box: XOR</a:t>
+            </a:r>
+          </a:p>
+          <a:p>
+            <a:pPr marL="285750" indent="-285750">
+              <a:lnSpc>
+                <a:spcPct val="200000"/>
+              </a:lnSpc>
+              <a:buFont typeface="Arial" panose="020B0604020202020204" pitchFamily="34" charset="0"/>
+              <a:buChar char="•"/>
+            </a:pPr>
+            <a:r>
+              <a:rPr lang="en-US" dirty="0"/>
+              <a:t>Result Box: 000010110</a:t>
+            </a:r>
+          </a:p>
+        </p:txBody>
+      </p:sp>
+    </p:spTree>
+    <p:extLst>
+      <p:ext uri="{BB962C8B-B14F-4D97-AF65-F5344CB8AC3E}">
+        <p14:creationId xmlns:p14="http://schemas.microsoft.com/office/powerpoint/2010/main" val="748359102"/>
+      </p:ext>
+    </p:extLst>
+  </p:cSld>
+  <p:clrMapOvr>
+    <a:masterClrMapping/>
+  </p:clrMapOvr>
+</p:sld>
+</file>
+
+<file path=ppt/slides/slide5.xml><?xml version="1.0" encoding="utf-8"?>
+<p:sld xmlns:a="http://schemas.openxmlformats.org/drawingml/2006/main" xmlns:r="http://schemas.openxmlformats.org/officeDocument/2006/relationships" xmlns:p="http://schemas.openxmlformats.org/presentationml/2006/main">
+  <p:cSld>
+    <p:spTree>
+      <p:nvGrpSpPr>
+        <p:cNvPr id="1" name=""/>
+        <p:cNvGrpSpPr/>
+        <p:nvPr/>
+      </p:nvGrpSpPr>
+      <p:grpSpPr>
+        <a:xfrm>
+          <a:off x="0" y="0"/>
+          <a:ext cx="0" cy="0"/>
+          <a:chOff x="0" y="0"/>
+          <a:chExt cx="0" cy="0"/>
+        </a:xfrm>
+      </p:grpSpPr>
+      <p:sp>
+        <p:nvSpPr>
+          <p:cNvPr id="2" name="Title 1">
+            <a:extLst>
+              <a:ext uri="{FF2B5EF4-FFF2-40B4-BE49-F238E27FC236}">
+                <a16:creationId xmlns:a16="http://schemas.microsoft.com/office/drawing/2014/main" id="{472CF91F-D154-44DB-874A-FFA7C0CAE8B3}"/>
+              </a:ext>
+            </a:extLst>
+          </p:cNvPr>
+          <p:cNvSpPr>
+            <a:spLocks noGrp="1"/>
+          </p:cNvSpPr>
+          <p:nvPr>
+            <p:ph type="title"/>
+          </p:nvPr>
+        </p:nvSpPr>
+        <p:spPr/>
+        <p:txBody>
+          <a:bodyPr/>
+          <a:lstStyle/>
+          <a:p>
+            <a:r>
+              <a:rPr lang="en-US" dirty="0"/>
+              <a:t>HEX Mode</a:t>
+            </a:r>
+          </a:p>
+        </p:txBody>
+      </p:sp>
+      <p:pic>
+        <p:nvPicPr>
+          <p:cNvPr id="5" name="Content Placeholder 4">
+            <a:extLst>
+              <a:ext uri="{FF2B5EF4-FFF2-40B4-BE49-F238E27FC236}">
+                <a16:creationId xmlns:a16="http://schemas.microsoft.com/office/drawing/2014/main" id="{0A535340-9837-4C40-9C0B-916F03BBBF9C}"/>
+              </a:ext>
+            </a:extLst>
+          </p:cNvPr>
+          <p:cNvPicPr>
+            <a:picLocks noGrp="1" noChangeAspect="1"/>
+          </p:cNvPicPr>
+          <p:nvPr>
+            <p:ph idx="1"/>
+          </p:nvPr>
+        </p:nvPicPr>
+        <p:blipFill>
+          <a:blip r:embed="rId2">
+            <a:extLst>
+              <a:ext uri="{28A0092B-C50C-407E-A947-70E740481C1C}">
+                <a14:useLocalDpi xmlns:a14="http://schemas.microsoft.com/office/drawing/2010/main" val="0"/>
+              </a:ext>
+            </a:extLst>
+          </a:blip>
+          <a:stretch>
+            <a:fillRect/>
+          </a:stretch>
+        </p:blipFill>
+        <p:spPr>
+          <a:xfrm>
+            <a:off x="8338657" y="-5437"/>
+            <a:ext cx="3853343" cy="6863437"/>
+          </a:xfrm>
+        </p:spPr>
+      </p:pic>
+      <p:sp>
+        <p:nvSpPr>
+          <p:cNvPr id="6" name="TextBox 5">
+            <a:extLst>
+              <a:ext uri="{FF2B5EF4-FFF2-40B4-BE49-F238E27FC236}">
+                <a16:creationId xmlns:a16="http://schemas.microsoft.com/office/drawing/2014/main" id="{50E2BC19-2A14-4EBC-81BB-67B4A82922BB}"/>
+              </a:ext>
+            </a:extLst>
+          </p:cNvPr>
+          <p:cNvSpPr txBox="1"/>
+          <p:nvPr/>
+        </p:nvSpPr>
+        <p:spPr>
+          <a:xfrm>
+            <a:off x="973123" y="1602297"/>
+            <a:ext cx="4546833" cy="2230739"/>
+          </a:xfrm>
+          <a:prstGeom prst="rect">
+            <a:avLst/>
+          </a:prstGeom>
+          <a:noFill/>
+        </p:spPr>
+        <p:txBody>
+          <a:bodyPr wrap="square" rtlCol="0">
+            <a:spAutoFit/>
+          </a:bodyPr>
+          <a:lstStyle/>
+          <a:p>
+            <a:pPr marL="285750" indent="-285750">
+              <a:lnSpc>
+                <a:spcPct val="200000"/>
+              </a:lnSpc>
+              <a:buFont typeface="Arial" panose="020B0604020202020204" pitchFamily="34" charset="0"/>
+              <a:buChar char="•"/>
+            </a:pPr>
+            <a:r>
+              <a:rPr lang="en-US" dirty="0"/>
+              <a:t>Input Box 1: 7DF85</a:t>
+            </a:r>
+          </a:p>
+          <a:p>
+            <a:pPr marL="285750" indent="-285750">
+              <a:lnSpc>
+                <a:spcPct val="200000"/>
+              </a:lnSpc>
+              <a:buFont typeface="Arial" panose="020B0604020202020204" pitchFamily="34" charset="0"/>
+              <a:buChar char="•"/>
+            </a:pPr>
+            <a:r>
+              <a:rPr lang="en-US" dirty="0"/>
+              <a:t>Input Box 2: FC67</a:t>
+            </a:r>
+          </a:p>
+          <a:p>
+            <a:pPr marL="285750" indent="-285750">
+              <a:lnSpc>
+                <a:spcPct val="200000"/>
+              </a:lnSpc>
+              <a:buFont typeface="Arial" panose="020B0604020202020204" pitchFamily="34" charset="0"/>
+              <a:buChar char="•"/>
+            </a:pPr>
+            <a:r>
+              <a:rPr lang="en-US" dirty="0"/>
+              <a:t>Operation Box: AND</a:t>
+            </a:r>
+          </a:p>
+          <a:p>
+            <a:pPr marL="285750" indent="-285750">
+              <a:lnSpc>
+                <a:spcPct val="200000"/>
+              </a:lnSpc>
+              <a:buFont typeface="Arial" panose="020B0604020202020204" pitchFamily="34" charset="0"/>
+              <a:buChar char="•"/>
+            </a:pPr>
+            <a:r>
+              <a:rPr lang="en-US" dirty="0"/>
+              <a:t>Result Box: 7C605</a:t>
+            </a:r>
+          </a:p>
+        </p:txBody>
+      </p:sp>
+    </p:spTree>
+    <p:extLst>
+      <p:ext uri="{BB962C8B-B14F-4D97-AF65-F5344CB8AC3E}">
+        <p14:creationId xmlns:p14="http://schemas.microsoft.com/office/powerpoint/2010/main" val="4175022633"/>
+      </p:ext>
+    </p:extLst>
+  </p:cSld>
+  <p:clrMapOvr>
+    <a:masterClrMapping/>
+  </p:clrMapOvr>
+</p:sld>
+</file>
+
+<file path=ppt/slides/slide6.xml><?xml version="1.0" encoding="utf-8"?>
+<p:sld xmlns:a="http://schemas.openxmlformats.org/drawingml/2006/main" xmlns:r="http://schemas.openxmlformats.org/officeDocument/2006/relationships" xmlns:p="http://schemas.openxmlformats.org/presentationml/2006/main">
+  <p:cSld>
+    <p:spTree>
+      <p:nvGrpSpPr>
+        <p:cNvPr id="1" name=""/>
+        <p:cNvGrpSpPr/>
+        <p:nvPr/>
+      </p:nvGrpSpPr>
+      <p:grpSpPr>
+        <a:xfrm>
+          <a:off x="0" y="0"/>
+          <a:ext cx="0" cy="0"/>
+          <a:chOff x="0" y="0"/>
+          <a:chExt cx="0" cy="0"/>
+        </a:xfrm>
+      </p:grpSpPr>
+      <p:sp>
+        <p:nvSpPr>
+          <p:cNvPr id="2" name="Title 1">
+            <a:extLst>
+              <a:ext uri="{FF2B5EF4-FFF2-40B4-BE49-F238E27FC236}">
+                <a16:creationId xmlns:a16="http://schemas.microsoft.com/office/drawing/2014/main" id="{37FDE127-6C78-4696-A0A3-84936E4B4E5E}"/>
+              </a:ext>
+            </a:extLst>
+          </p:cNvPr>
+          <p:cNvSpPr>
+            <a:spLocks noGrp="1"/>
+          </p:cNvSpPr>
+          <p:nvPr>
+            <p:ph type="title"/>
+          </p:nvPr>
+        </p:nvSpPr>
+        <p:spPr/>
+        <p:txBody>
+          <a:bodyPr/>
+          <a:lstStyle/>
+          <a:p>
+            <a:pPr algn="ctr"/>
+            <a:r>
+              <a:rPr lang="en-US" dirty="0"/>
+              <a:t>Event Listener Example</a:t>
+            </a:r>
+          </a:p>
+        </p:txBody>
+      </p:sp>
+      <p:pic>
+        <p:nvPicPr>
+          <p:cNvPr id="5" name="Content Placeholder 4">
+            <a:extLst>
+              <a:ext uri="{FF2B5EF4-FFF2-40B4-BE49-F238E27FC236}">
+                <a16:creationId xmlns:a16="http://schemas.microsoft.com/office/drawing/2014/main" id="{68A3C950-5081-48A6-8C5D-1C0978342340}"/>
+              </a:ext>
+            </a:extLst>
+          </p:cNvPr>
+          <p:cNvPicPr>
+            <a:picLocks noGrp="1" noChangeAspect="1"/>
+          </p:cNvPicPr>
+          <p:nvPr>
+            <p:ph idx="1"/>
+          </p:nvPr>
+        </p:nvPicPr>
+        <p:blipFill>
+          <a:blip r:embed="rId2">
+            <a:extLst>
+              <a:ext uri="{28A0092B-C50C-407E-A947-70E740481C1C}">
+                <a14:useLocalDpi xmlns:a14="http://schemas.microsoft.com/office/drawing/2010/main" val="0"/>
+              </a:ext>
+            </a:extLst>
+          </a:blip>
+          <a:stretch>
+            <a:fillRect/>
+          </a:stretch>
+        </p:blipFill>
+        <p:spPr>
+          <a:xfrm>
+            <a:off x="66262" y="2066542"/>
+            <a:ext cx="11921803" cy="3543350"/>
+          </a:xfrm>
+        </p:spPr>
+      </p:pic>
+    </p:spTree>
+    <p:extLst>
+      <p:ext uri="{BB962C8B-B14F-4D97-AF65-F5344CB8AC3E}">
+        <p14:creationId xmlns:p14="http://schemas.microsoft.com/office/powerpoint/2010/main" val="1702504906"/>
+      </p:ext>
+    </p:extLst>
+  </p:cSld>
+  <p:clrMapOvr>
+    <a:masterClrMapping/>
+  </p:clrMapOvr>
+</p:sld>
+</file>
+
+<file path=ppt/slides/slide7.xml><?xml version="1.0" encoding="utf-8"?>
+<p:sld xmlns:a="http://schemas.openxmlformats.org/drawingml/2006/main" xmlns:r="http://schemas.openxmlformats.org/officeDocument/2006/relationships" xmlns:p="http://schemas.openxmlformats.org/presentationml/2006/main">
+  <p:cSld>
+    <p:spTree>
+      <p:nvGrpSpPr>
+        <p:cNvPr id="1" name=""/>
+        <p:cNvGrpSpPr/>
+        <p:nvPr/>
+      </p:nvGrpSpPr>
+      <p:grpSpPr>
+        <a:xfrm>
+          <a:off x="0" y="0"/>
+          <a:ext cx="0" cy="0"/>
+          <a:chOff x="0" y="0"/>
+          <a:chExt cx="0" cy="0"/>
+        </a:xfrm>
+      </p:grpSpPr>
+      <p:sp>
+        <p:nvSpPr>
+          <p:cNvPr id="2" name="Title 1">
+            <a:extLst>
+              <a:ext uri="{FF2B5EF4-FFF2-40B4-BE49-F238E27FC236}">
+                <a16:creationId xmlns:a16="http://schemas.microsoft.com/office/drawing/2014/main" id="{94CB15E4-E213-454D-884B-619F61F8378C}"/>
+              </a:ext>
+            </a:extLst>
+          </p:cNvPr>
+          <p:cNvSpPr>
+            <a:spLocks noGrp="1"/>
+          </p:cNvSpPr>
+          <p:nvPr>
+            <p:ph type="title"/>
+          </p:nvPr>
+        </p:nvSpPr>
+        <p:spPr/>
+        <p:txBody>
+          <a:bodyPr/>
+          <a:lstStyle/>
+          <a:p>
+            <a:pPr algn="ctr"/>
+            <a:r>
+              <a:rPr lang="en-US" dirty="0"/>
+              <a:t>Assigning Listeners to Views</a:t>
+            </a:r>
+          </a:p>
+        </p:txBody>
+      </p:sp>
+      <p:pic>
+        <p:nvPicPr>
+          <p:cNvPr id="5" name="Content Placeholder 4">
+            <a:extLst>
+              <a:ext uri="{FF2B5EF4-FFF2-40B4-BE49-F238E27FC236}">
+                <a16:creationId xmlns:a16="http://schemas.microsoft.com/office/drawing/2014/main" id="{D3E7410C-0FB0-4F37-B181-E451FE7B62B6}"/>
+              </a:ext>
+            </a:extLst>
+          </p:cNvPr>
+          <p:cNvPicPr>
+            <a:picLocks noGrp="1" noChangeAspect="1"/>
+          </p:cNvPicPr>
+          <p:nvPr>
+            <p:ph idx="1"/>
+          </p:nvPr>
+        </p:nvPicPr>
+        <p:blipFill>
+          <a:blip r:embed="rId2">
+            <a:extLst>
+              <a:ext uri="{28A0092B-C50C-407E-A947-70E740481C1C}">
+                <a14:useLocalDpi xmlns:a14="http://schemas.microsoft.com/office/drawing/2010/main" val="0"/>
+              </a:ext>
+            </a:extLst>
+          </a:blip>
+          <a:stretch>
+            <a:fillRect/>
+          </a:stretch>
+        </p:blipFill>
+        <p:spPr>
+          <a:xfrm>
+            <a:off x="3003258" y="1284687"/>
+            <a:ext cx="6185483" cy="5573313"/>
+          </a:xfrm>
+        </p:spPr>
+      </p:pic>
+    </p:spTree>
+    <p:extLst>
+      <p:ext uri="{BB962C8B-B14F-4D97-AF65-F5344CB8AC3E}">
+        <p14:creationId xmlns:p14="http://schemas.microsoft.com/office/powerpoint/2010/main" val="3467027583"/>
       </p:ext>
     </p:extLst>
   </p:cSld>

</xml_diff>